<commit_message>
Combining chapter 1 and 2 into a manuscript
</commit_message>
<xml_diff>
--- a/writing/Figures.pptx
+++ b/writing/Figures.pptx
@@ -5,12 +5,15 @@
     <p:sldMasterId id="2147483648" r:id="rId1"/>
   </p:sldMasterIdLst>
   <p:sldIdLst>
-    <p:sldId id="256" r:id="rId2"/>
-    <p:sldId id="260" r:id="rId3"/>
-    <p:sldId id="261" r:id="rId4"/>
-    <p:sldId id="263" r:id="rId5"/>
-    <p:sldId id="257" r:id="rId6"/>
-    <p:sldId id="262" r:id="rId7"/>
+    <p:sldId id="264" r:id="rId2"/>
+    <p:sldId id="265" r:id="rId3"/>
+    <p:sldId id="266" r:id="rId4"/>
+    <p:sldId id="256" r:id="rId5"/>
+    <p:sldId id="260" r:id="rId6"/>
+    <p:sldId id="261" r:id="rId7"/>
+    <p:sldId id="263" r:id="rId8"/>
+    <p:sldId id="257" r:id="rId9"/>
+    <p:sldId id="262" r:id="rId10"/>
   </p:sldIdLst>
   <p:sldSz cx="12192000" cy="6858000"/>
   <p:notesSz cx="6858000" cy="9144000"/>
@@ -109,6 +112,11 @@
       </a:defRPr>
     </a:lvl9pPr>
   </p:defaultTextStyle>
+  <p:extLst>
+    <p:ext uri="{EFAFB233-063F-42B5-8137-9DF3F51BA10A}">
+      <p15:sldGuideLst xmlns:p15="http://schemas.microsoft.com/office/powerpoint/2012/main"/>
+    </p:ext>
+  </p:extLst>
 </p:presentation>
 </file>
 
@@ -259,7 +267,7 @@
           <a:p>
             <a:fld id="{52964F55-9B83-459D-AAEE-908F73F32722}" type="datetimeFigureOut">
               <a:rPr lang="en-US" smtClean="0"/>
-              <a:t>1/20/2023</a:t>
+              <a:t>2/21/2023</a:t>
             </a:fld>
             <a:endParaRPr lang="en-US"/>
           </a:p>
@@ -457,7 +465,7 @@
           <a:p>
             <a:fld id="{52964F55-9B83-459D-AAEE-908F73F32722}" type="datetimeFigureOut">
               <a:rPr lang="en-US" smtClean="0"/>
-              <a:t>1/20/2023</a:t>
+              <a:t>2/21/2023</a:t>
             </a:fld>
             <a:endParaRPr lang="en-US"/>
           </a:p>
@@ -665,7 +673,7 @@
           <a:p>
             <a:fld id="{52964F55-9B83-459D-AAEE-908F73F32722}" type="datetimeFigureOut">
               <a:rPr lang="en-US" smtClean="0"/>
-              <a:t>1/20/2023</a:t>
+              <a:t>2/21/2023</a:t>
             </a:fld>
             <a:endParaRPr lang="en-US"/>
           </a:p>
@@ -863,7 +871,7 @@
           <a:p>
             <a:fld id="{52964F55-9B83-459D-AAEE-908F73F32722}" type="datetimeFigureOut">
               <a:rPr lang="en-US" smtClean="0"/>
-              <a:t>1/20/2023</a:t>
+              <a:t>2/21/2023</a:t>
             </a:fld>
             <a:endParaRPr lang="en-US"/>
           </a:p>
@@ -1138,7 +1146,7 @@
           <a:p>
             <a:fld id="{52964F55-9B83-459D-AAEE-908F73F32722}" type="datetimeFigureOut">
               <a:rPr lang="en-US" smtClean="0"/>
-              <a:t>1/20/2023</a:t>
+              <a:t>2/21/2023</a:t>
             </a:fld>
             <a:endParaRPr lang="en-US"/>
           </a:p>
@@ -1403,7 +1411,7 @@
           <a:p>
             <a:fld id="{52964F55-9B83-459D-AAEE-908F73F32722}" type="datetimeFigureOut">
               <a:rPr lang="en-US" smtClean="0"/>
-              <a:t>1/20/2023</a:t>
+              <a:t>2/21/2023</a:t>
             </a:fld>
             <a:endParaRPr lang="en-US"/>
           </a:p>
@@ -1815,7 +1823,7 @@
           <a:p>
             <a:fld id="{52964F55-9B83-459D-AAEE-908F73F32722}" type="datetimeFigureOut">
               <a:rPr lang="en-US" smtClean="0"/>
-              <a:t>1/20/2023</a:t>
+              <a:t>2/21/2023</a:t>
             </a:fld>
             <a:endParaRPr lang="en-US"/>
           </a:p>
@@ -1956,7 +1964,7 @@
           <a:p>
             <a:fld id="{52964F55-9B83-459D-AAEE-908F73F32722}" type="datetimeFigureOut">
               <a:rPr lang="en-US" smtClean="0"/>
-              <a:t>1/20/2023</a:t>
+              <a:t>2/21/2023</a:t>
             </a:fld>
             <a:endParaRPr lang="en-US"/>
           </a:p>
@@ -2069,7 +2077,7 @@
           <a:p>
             <a:fld id="{52964F55-9B83-459D-AAEE-908F73F32722}" type="datetimeFigureOut">
               <a:rPr lang="en-US" smtClean="0"/>
-              <a:t>1/20/2023</a:t>
+              <a:t>2/21/2023</a:t>
             </a:fld>
             <a:endParaRPr lang="en-US"/>
           </a:p>
@@ -2380,7 +2388,7 @@
           <a:p>
             <a:fld id="{52964F55-9B83-459D-AAEE-908F73F32722}" type="datetimeFigureOut">
               <a:rPr lang="en-US" smtClean="0"/>
-              <a:t>1/20/2023</a:t>
+              <a:t>2/21/2023</a:t>
             </a:fld>
             <a:endParaRPr lang="en-US"/>
           </a:p>
@@ -2668,7 +2676,7 @@
           <a:p>
             <a:fld id="{52964F55-9B83-459D-AAEE-908F73F32722}" type="datetimeFigureOut">
               <a:rPr lang="en-US" smtClean="0"/>
-              <a:t>1/20/2023</a:t>
+              <a:t>2/21/2023</a:t>
             </a:fld>
             <a:endParaRPr lang="en-US"/>
           </a:p>
@@ -2909,7 +2917,7 @@
           <a:p>
             <a:fld id="{52964F55-9B83-459D-AAEE-908F73F32722}" type="datetimeFigureOut">
               <a:rPr lang="en-US" smtClean="0"/>
-              <a:t>1/20/2023</a:t>
+              <a:t>2/21/2023</a:t>
             </a:fld>
             <a:endParaRPr lang="en-US"/>
           </a:p>
@@ -3326,6 +3334,1579 @@
           <a:chExt cx="0" cy="0"/>
         </a:xfrm>
       </p:grpSpPr>
+      <p:grpSp>
+        <p:nvGrpSpPr>
+          <p:cNvPr id="45" name="Group 44">
+            <a:extLst>
+              <a:ext uri="{FF2B5EF4-FFF2-40B4-BE49-F238E27FC236}">
+                <a16:creationId xmlns:a16="http://schemas.microsoft.com/office/drawing/2014/main" id="{F901017F-A93F-E14E-F626-80638697F533}"/>
+              </a:ext>
+            </a:extLst>
+          </p:cNvPr>
+          <p:cNvGrpSpPr/>
+          <p:nvPr/>
+        </p:nvGrpSpPr>
+        <p:grpSpPr>
+          <a:xfrm>
+            <a:off x="658448" y="786267"/>
+            <a:ext cx="9955160" cy="5614219"/>
+            <a:chOff x="629265" y="757084"/>
+            <a:chExt cx="9955160" cy="5614219"/>
+          </a:xfrm>
+        </p:grpSpPr>
+        <p:grpSp>
+          <p:nvGrpSpPr>
+            <p:cNvPr id="38" name="Group 37">
+              <a:extLst>
+                <a:ext uri="{FF2B5EF4-FFF2-40B4-BE49-F238E27FC236}">
+                  <a16:creationId xmlns:a16="http://schemas.microsoft.com/office/drawing/2014/main" id="{E1705B8C-CD73-507E-E275-70D9789D95FD}"/>
+                </a:ext>
+              </a:extLst>
+            </p:cNvPr>
+            <p:cNvGrpSpPr/>
+            <p:nvPr/>
+          </p:nvGrpSpPr>
+          <p:grpSpPr>
+            <a:xfrm>
+              <a:off x="629265" y="757084"/>
+              <a:ext cx="7875638" cy="5614219"/>
+              <a:chOff x="629265" y="757084"/>
+              <a:chExt cx="7875638" cy="5614219"/>
+            </a:xfrm>
+          </p:grpSpPr>
+          <p:pic>
+            <p:nvPicPr>
+              <p:cNvPr id="3" name="Graphic 2">
+                <a:extLst>
+                  <a:ext uri="{FF2B5EF4-FFF2-40B4-BE49-F238E27FC236}">
+                    <a16:creationId xmlns:a16="http://schemas.microsoft.com/office/drawing/2014/main" id="{F28BD36F-B7CD-6075-2CCD-36FE929B84C4}"/>
+                  </a:ext>
+                </a:extLst>
+              </p:cNvPr>
+              <p:cNvPicPr>
+                <a:picLocks noChangeAspect="1"/>
+              </p:cNvPicPr>
+              <p:nvPr/>
+            </p:nvPicPr>
+            <p:blipFill rotWithShape="1">
+              <a:blip r:embed="rId2">
+                <a:extLst>
+                  <a:ext uri="{28A0092B-C50C-407E-A947-70E740481C1C}">
+                    <a14:useLocalDpi xmlns:a14="http://schemas.microsoft.com/office/drawing/2010/main" val="0"/>
+                  </a:ext>
+                  <a:ext uri="{96DAC541-7B7A-43D3-8B79-37D633B846F1}">
+                    <asvg:svgBlip xmlns:asvg="http://schemas.microsoft.com/office/drawing/2016/SVG/main" r:embed="rId3"/>
+                  </a:ext>
+                </a:extLst>
+              </a:blip>
+              <a:srcRect l="6240" t="11183" r="5021" b="18710"/>
+              <a:stretch/>
+            </p:blipFill>
+            <p:spPr>
+              <a:xfrm>
+                <a:off x="629265" y="766916"/>
+                <a:ext cx="7875638" cy="4807974"/>
+              </a:xfrm>
+              <a:prstGeom prst="rect">
+                <a:avLst/>
+              </a:prstGeom>
+            </p:spPr>
+          </p:pic>
+          <p:pic>
+            <p:nvPicPr>
+              <p:cNvPr id="6" name="Graphic 5">
+                <a:extLst>
+                  <a:ext uri="{FF2B5EF4-FFF2-40B4-BE49-F238E27FC236}">
+                    <a16:creationId xmlns:a16="http://schemas.microsoft.com/office/drawing/2014/main" id="{1E33B6FB-6B5B-D05B-7711-742C46182584}"/>
+                  </a:ext>
+                </a:extLst>
+              </p:cNvPr>
+              <p:cNvPicPr>
+                <a:picLocks noChangeAspect="1"/>
+              </p:cNvPicPr>
+              <p:nvPr/>
+            </p:nvPicPr>
+            <p:blipFill rotWithShape="1">
+              <a:blip r:embed="rId4">
+                <a:extLst>
+                  <a:ext uri="{28A0092B-C50C-407E-A947-70E740481C1C}">
+                    <a14:useLocalDpi xmlns:a14="http://schemas.microsoft.com/office/drawing/2010/main" val="0"/>
+                  </a:ext>
+                  <a:ext uri="{96DAC541-7B7A-43D3-8B79-37D633B846F1}">
+                    <asvg:svgBlip xmlns:asvg="http://schemas.microsoft.com/office/drawing/2016/SVG/main" r:embed="rId5"/>
+                  </a:ext>
+                </a:extLst>
+              </a:blip>
+              <a:srcRect l="67670" t="82796" b="5735"/>
+              <a:stretch/>
+            </p:blipFill>
+            <p:spPr>
+              <a:xfrm>
+                <a:off x="629266" y="4822872"/>
+                <a:ext cx="2743200" cy="752018"/>
+              </a:xfrm>
+              <a:prstGeom prst="rect">
+                <a:avLst/>
+              </a:prstGeom>
+            </p:spPr>
+          </p:pic>
+          <p:sp>
+            <p:nvSpPr>
+              <p:cNvPr id="35" name="Freeform: Shape 34">
+                <a:extLst>
+                  <a:ext uri="{FF2B5EF4-FFF2-40B4-BE49-F238E27FC236}">
+                    <a16:creationId xmlns:a16="http://schemas.microsoft.com/office/drawing/2014/main" id="{13661478-DB13-5374-7732-9EBF8CDE4C2D}"/>
+                  </a:ext>
+                </a:extLst>
+              </p:cNvPr>
+              <p:cNvSpPr/>
+              <p:nvPr/>
+            </p:nvSpPr>
+            <p:spPr>
+              <a:xfrm>
+                <a:off x="2733368" y="3667433"/>
+                <a:ext cx="3352800" cy="2703870"/>
+              </a:xfrm>
+              <a:custGeom>
+                <a:avLst/>
+                <a:gdLst>
+                  <a:gd name="connsiteX0" fmla="*/ 58993 w 3352800"/>
+                  <a:gd name="connsiteY0" fmla="*/ 383458 h 2939845"/>
+                  <a:gd name="connsiteX1" fmla="*/ 3352800 w 3352800"/>
+                  <a:gd name="connsiteY1" fmla="*/ 0 h 2939845"/>
+                  <a:gd name="connsiteX2" fmla="*/ 3352800 w 3352800"/>
+                  <a:gd name="connsiteY2" fmla="*/ 2939845 h 2939845"/>
+                  <a:gd name="connsiteX3" fmla="*/ 0 w 3352800"/>
+                  <a:gd name="connsiteY3" fmla="*/ 580103 h 2939845"/>
+                  <a:gd name="connsiteX4" fmla="*/ 88490 w 3352800"/>
+                  <a:gd name="connsiteY4" fmla="*/ 491612 h 2939845"/>
+                  <a:gd name="connsiteX5" fmla="*/ 58993 w 3352800"/>
+                  <a:gd name="connsiteY5" fmla="*/ 383458 h 2939845"/>
+                  <a:gd name="connsiteX0" fmla="*/ 58993 w 3352800"/>
+                  <a:gd name="connsiteY0" fmla="*/ 393290 h 2949677"/>
+                  <a:gd name="connsiteX1" fmla="*/ 3352800 w 3352800"/>
+                  <a:gd name="connsiteY1" fmla="*/ 0 h 2949677"/>
+                  <a:gd name="connsiteX2" fmla="*/ 3352800 w 3352800"/>
+                  <a:gd name="connsiteY2" fmla="*/ 2949677 h 2949677"/>
+                  <a:gd name="connsiteX3" fmla="*/ 0 w 3352800"/>
+                  <a:gd name="connsiteY3" fmla="*/ 589935 h 2949677"/>
+                  <a:gd name="connsiteX4" fmla="*/ 88490 w 3352800"/>
+                  <a:gd name="connsiteY4" fmla="*/ 501444 h 2949677"/>
+                  <a:gd name="connsiteX5" fmla="*/ 58993 w 3352800"/>
+                  <a:gd name="connsiteY5" fmla="*/ 393290 h 2949677"/>
+                  <a:gd name="connsiteX0" fmla="*/ 58993 w 3352800"/>
+                  <a:gd name="connsiteY0" fmla="*/ 393290 h 2959509"/>
+                  <a:gd name="connsiteX1" fmla="*/ 3352800 w 3352800"/>
+                  <a:gd name="connsiteY1" fmla="*/ 0 h 2959509"/>
+                  <a:gd name="connsiteX2" fmla="*/ 3352800 w 3352800"/>
+                  <a:gd name="connsiteY2" fmla="*/ 2959509 h 2959509"/>
+                  <a:gd name="connsiteX3" fmla="*/ 0 w 3352800"/>
+                  <a:gd name="connsiteY3" fmla="*/ 589935 h 2959509"/>
+                  <a:gd name="connsiteX4" fmla="*/ 88490 w 3352800"/>
+                  <a:gd name="connsiteY4" fmla="*/ 501444 h 2959509"/>
+                  <a:gd name="connsiteX5" fmla="*/ 58993 w 3352800"/>
+                  <a:gd name="connsiteY5" fmla="*/ 393290 h 2959509"/>
+                  <a:gd name="connsiteX0" fmla="*/ 58993 w 3352800"/>
+                  <a:gd name="connsiteY0" fmla="*/ 393290 h 2703870"/>
+                  <a:gd name="connsiteX1" fmla="*/ 3352800 w 3352800"/>
+                  <a:gd name="connsiteY1" fmla="*/ 0 h 2703870"/>
+                  <a:gd name="connsiteX2" fmla="*/ 3342968 w 3352800"/>
+                  <a:gd name="connsiteY2" fmla="*/ 2703870 h 2703870"/>
+                  <a:gd name="connsiteX3" fmla="*/ 0 w 3352800"/>
+                  <a:gd name="connsiteY3" fmla="*/ 589935 h 2703870"/>
+                  <a:gd name="connsiteX4" fmla="*/ 88490 w 3352800"/>
+                  <a:gd name="connsiteY4" fmla="*/ 501444 h 2703870"/>
+                  <a:gd name="connsiteX5" fmla="*/ 58993 w 3352800"/>
+                  <a:gd name="connsiteY5" fmla="*/ 393290 h 2703870"/>
+                </a:gdLst>
+                <a:ahLst/>
+                <a:cxnLst>
+                  <a:cxn ang="0">
+                    <a:pos x="connsiteX0" y="connsiteY0"/>
+                  </a:cxn>
+                  <a:cxn ang="0">
+                    <a:pos x="connsiteX1" y="connsiteY1"/>
+                  </a:cxn>
+                  <a:cxn ang="0">
+                    <a:pos x="connsiteX2" y="connsiteY2"/>
+                  </a:cxn>
+                  <a:cxn ang="0">
+                    <a:pos x="connsiteX3" y="connsiteY3"/>
+                  </a:cxn>
+                  <a:cxn ang="0">
+                    <a:pos x="connsiteX4" y="connsiteY4"/>
+                  </a:cxn>
+                  <a:cxn ang="0">
+                    <a:pos x="connsiteX5" y="connsiteY5"/>
+                  </a:cxn>
+                </a:cxnLst>
+                <a:rect l="l" t="t" r="r" b="b"/>
+                <a:pathLst>
+                  <a:path w="3352800" h="2703870">
+                    <a:moveTo>
+                      <a:pt x="58993" y="393290"/>
+                    </a:moveTo>
+                    <a:lnTo>
+                      <a:pt x="3352800" y="0"/>
+                    </a:lnTo>
+                    <a:cubicBezTo>
+                      <a:pt x="3349523" y="901290"/>
+                      <a:pt x="3346245" y="1802580"/>
+                      <a:pt x="3342968" y="2703870"/>
+                    </a:cubicBezTo>
+                    <a:lnTo>
+                      <a:pt x="0" y="589935"/>
+                    </a:lnTo>
+                    <a:lnTo>
+                      <a:pt x="88490" y="501444"/>
+                    </a:lnTo>
+                    <a:lnTo>
+                      <a:pt x="58993" y="393290"/>
+                    </a:lnTo>
+                    <a:close/>
+                  </a:path>
+                </a:pathLst>
+              </a:custGeom>
+              <a:solidFill>
+                <a:srgbClr val="C00000">
+                  <a:alpha val="20000"/>
+                </a:srgbClr>
+              </a:solidFill>
+              <a:ln>
+                <a:noFill/>
+              </a:ln>
+            </p:spPr>
+            <p:style>
+              <a:lnRef idx="2">
+                <a:schemeClr val="accent1">
+                  <a:shade val="50000"/>
+                </a:schemeClr>
+              </a:lnRef>
+              <a:fillRef idx="1">
+                <a:schemeClr val="accent1"/>
+              </a:fillRef>
+              <a:effectRef idx="0">
+                <a:schemeClr val="accent1"/>
+              </a:effectRef>
+              <a:fontRef idx="minor">
+                <a:schemeClr val="lt1"/>
+              </a:fontRef>
+            </p:style>
+            <p:txBody>
+              <a:bodyPr rtlCol="0" anchor="ctr"/>
+              <a:lstStyle/>
+              <a:p>
+                <a:pPr algn="ctr"/>
+                <a:endParaRPr lang="en-US"/>
+              </a:p>
+            </p:txBody>
+          </p:sp>
+          <p:sp>
+            <p:nvSpPr>
+              <p:cNvPr id="37" name="Freeform: Shape 36">
+                <a:extLst>
+                  <a:ext uri="{FF2B5EF4-FFF2-40B4-BE49-F238E27FC236}">
+                    <a16:creationId xmlns:a16="http://schemas.microsoft.com/office/drawing/2014/main" id="{C15A6ECE-8BA3-A99E-ADAC-833BCC37D8C5}"/>
+                  </a:ext>
+                </a:extLst>
+              </p:cNvPr>
+              <p:cNvSpPr/>
+              <p:nvPr/>
+            </p:nvSpPr>
+            <p:spPr>
+              <a:xfrm>
+                <a:off x="3529781" y="757084"/>
+                <a:ext cx="3588774" cy="2428568"/>
+              </a:xfrm>
+              <a:custGeom>
+                <a:avLst/>
+                <a:gdLst>
+                  <a:gd name="connsiteX0" fmla="*/ 0 w 3588774"/>
+                  <a:gd name="connsiteY0" fmla="*/ 973393 h 2428568"/>
+                  <a:gd name="connsiteX1" fmla="*/ 98322 w 3588774"/>
+                  <a:gd name="connsiteY1" fmla="*/ 1061884 h 2428568"/>
+                  <a:gd name="connsiteX2" fmla="*/ 58993 w 3588774"/>
+                  <a:gd name="connsiteY2" fmla="*/ 1219200 h 2428568"/>
+                  <a:gd name="connsiteX3" fmla="*/ 3588774 w 3588774"/>
+                  <a:gd name="connsiteY3" fmla="*/ 2428568 h 2428568"/>
+                  <a:gd name="connsiteX4" fmla="*/ 3588774 w 3588774"/>
+                  <a:gd name="connsiteY4" fmla="*/ 0 h 2428568"/>
+                  <a:gd name="connsiteX5" fmla="*/ 0 w 3588774"/>
+                  <a:gd name="connsiteY5" fmla="*/ 973393 h 2428568"/>
+                </a:gdLst>
+                <a:ahLst/>
+                <a:cxnLst>
+                  <a:cxn ang="0">
+                    <a:pos x="connsiteX0" y="connsiteY0"/>
+                  </a:cxn>
+                  <a:cxn ang="0">
+                    <a:pos x="connsiteX1" y="connsiteY1"/>
+                  </a:cxn>
+                  <a:cxn ang="0">
+                    <a:pos x="connsiteX2" y="connsiteY2"/>
+                  </a:cxn>
+                  <a:cxn ang="0">
+                    <a:pos x="connsiteX3" y="connsiteY3"/>
+                  </a:cxn>
+                  <a:cxn ang="0">
+                    <a:pos x="connsiteX4" y="connsiteY4"/>
+                  </a:cxn>
+                  <a:cxn ang="0">
+                    <a:pos x="connsiteX5" y="connsiteY5"/>
+                  </a:cxn>
+                </a:cxnLst>
+                <a:rect l="l" t="t" r="r" b="b"/>
+                <a:pathLst>
+                  <a:path w="3588774" h="2428568">
+                    <a:moveTo>
+                      <a:pt x="0" y="973393"/>
+                    </a:moveTo>
+                    <a:lnTo>
+                      <a:pt x="98322" y="1061884"/>
+                    </a:lnTo>
+                    <a:lnTo>
+                      <a:pt x="58993" y="1219200"/>
+                    </a:lnTo>
+                    <a:lnTo>
+                      <a:pt x="3588774" y="2428568"/>
+                    </a:lnTo>
+                    <a:lnTo>
+                      <a:pt x="3588774" y="0"/>
+                    </a:lnTo>
+                    <a:lnTo>
+                      <a:pt x="0" y="973393"/>
+                    </a:lnTo>
+                    <a:close/>
+                  </a:path>
+                </a:pathLst>
+              </a:custGeom>
+              <a:solidFill>
+                <a:schemeClr val="accent5">
+                  <a:alpha val="20000"/>
+                </a:schemeClr>
+              </a:solidFill>
+              <a:ln>
+                <a:noFill/>
+              </a:ln>
+            </p:spPr>
+            <p:style>
+              <a:lnRef idx="2">
+                <a:schemeClr val="accent1">
+                  <a:shade val="50000"/>
+                </a:schemeClr>
+              </a:lnRef>
+              <a:fillRef idx="1">
+                <a:schemeClr val="accent1"/>
+              </a:fillRef>
+              <a:effectRef idx="0">
+                <a:schemeClr val="accent1"/>
+              </a:effectRef>
+              <a:fontRef idx="minor">
+                <a:schemeClr val="lt1"/>
+              </a:fontRef>
+            </p:style>
+            <p:txBody>
+              <a:bodyPr rtlCol="0" anchor="ctr"/>
+              <a:lstStyle/>
+              <a:p>
+                <a:pPr algn="ctr"/>
+                <a:endParaRPr lang="en-US"/>
+              </a:p>
+            </p:txBody>
+          </p:sp>
+        </p:grpSp>
+        <p:grpSp>
+          <p:nvGrpSpPr>
+            <p:cNvPr id="41" name="Group 40">
+              <a:extLst>
+                <a:ext uri="{FF2B5EF4-FFF2-40B4-BE49-F238E27FC236}">
+                  <a16:creationId xmlns:a16="http://schemas.microsoft.com/office/drawing/2014/main" id="{A0933E33-C69C-D976-5135-DC5C0FB82D2B}"/>
+                </a:ext>
+              </a:extLst>
+            </p:cNvPr>
+            <p:cNvGrpSpPr/>
+            <p:nvPr/>
+          </p:nvGrpSpPr>
+          <p:grpSpPr>
+            <a:xfrm>
+              <a:off x="7118555" y="757084"/>
+              <a:ext cx="3465870" cy="2425745"/>
+              <a:chOff x="2340077" y="953729"/>
+              <a:chExt cx="3465870" cy="2425745"/>
+            </a:xfrm>
+          </p:grpSpPr>
+          <p:pic>
+            <p:nvPicPr>
+              <p:cNvPr id="39" name="Picture 38" descr="Map&#10;&#10;Description automatically generated">
+                <a:extLst>
+                  <a:ext uri="{FF2B5EF4-FFF2-40B4-BE49-F238E27FC236}">
+                    <a16:creationId xmlns:a16="http://schemas.microsoft.com/office/drawing/2014/main" id="{6E3DDB6A-0776-F04F-F652-474A84C8609B}"/>
+                  </a:ext>
+                </a:extLst>
+              </p:cNvPr>
+              <p:cNvPicPr>
+                <a:picLocks noChangeAspect="1"/>
+              </p:cNvPicPr>
+              <p:nvPr/>
+            </p:nvPicPr>
+            <p:blipFill rotWithShape="1">
+              <a:blip r:embed="rId6">
+                <a:extLst>
+                  <a:ext uri="{28A0092B-C50C-407E-A947-70E740481C1C}">
+                    <a14:useLocalDpi xmlns:a14="http://schemas.microsoft.com/office/drawing/2010/main" val="0"/>
+                  </a:ext>
+                </a:extLst>
+              </a:blip>
+              <a:srcRect l="21915" t="11433" r="18889" b="34722"/>
+              <a:stretch/>
+            </p:blipFill>
+            <p:spPr>
+              <a:xfrm>
+                <a:off x="2340077" y="953730"/>
+                <a:ext cx="3451123" cy="2425744"/>
+              </a:xfrm>
+              <a:prstGeom prst="rect">
+                <a:avLst/>
+              </a:prstGeom>
+              <a:ln w="12700">
+                <a:solidFill>
+                  <a:schemeClr val="tx1"/>
+                </a:solidFill>
+              </a:ln>
+            </p:spPr>
+          </p:pic>
+          <p:pic>
+            <p:nvPicPr>
+              <p:cNvPr id="40" name="Picture 39" descr="Map&#10;&#10;Description automatically generated">
+                <a:extLst>
+                  <a:ext uri="{FF2B5EF4-FFF2-40B4-BE49-F238E27FC236}">
+                    <a16:creationId xmlns:a16="http://schemas.microsoft.com/office/drawing/2014/main" id="{4FD6372C-B1FA-1451-101F-7E5BD981023D}"/>
+                  </a:ext>
+                </a:extLst>
+              </p:cNvPr>
+              <p:cNvPicPr>
+                <a:picLocks noChangeAspect="1"/>
+              </p:cNvPicPr>
+              <p:nvPr/>
+            </p:nvPicPr>
+            <p:blipFill rotWithShape="1">
+              <a:blip r:embed="rId6">
+                <a:extLst>
+                  <a:ext uri="{28A0092B-C50C-407E-A947-70E740481C1C}">
+                    <a14:useLocalDpi xmlns:a14="http://schemas.microsoft.com/office/drawing/2010/main" val="0"/>
+                  </a:ext>
+                </a:extLst>
+              </a:blip>
+              <a:srcRect l="68210" t="83307" r="4300" b="6064"/>
+              <a:stretch/>
+            </p:blipFill>
+            <p:spPr>
+              <a:xfrm>
+                <a:off x="4203288" y="953729"/>
+                <a:ext cx="1602659" cy="478818"/>
+              </a:xfrm>
+              <a:prstGeom prst="rect">
+                <a:avLst/>
+              </a:prstGeom>
+            </p:spPr>
+          </p:pic>
+        </p:grpSp>
+        <p:grpSp>
+          <p:nvGrpSpPr>
+            <p:cNvPr id="44" name="Group 43">
+              <a:extLst>
+                <a:ext uri="{FF2B5EF4-FFF2-40B4-BE49-F238E27FC236}">
+                  <a16:creationId xmlns:a16="http://schemas.microsoft.com/office/drawing/2014/main" id="{F70D4993-CF46-6117-DED3-65AA8FE89057}"/>
+                </a:ext>
+              </a:extLst>
+            </p:cNvPr>
+            <p:cNvGrpSpPr/>
+            <p:nvPr/>
+          </p:nvGrpSpPr>
+          <p:grpSpPr>
+            <a:xfrm>
+              <a:off x="6086168" y="3664610"/>
+              <a:ext cx="2487561" cy="2694039"/>
+              <a:chOff x="6086168" y="3664610"/>
+              <a:chExt cx="2487561" cy="2694039"/>
+            </a:xfrm>
+          </p:grpSpPr>
+          <p:pic>
+            <p:nvPicPr>
+              <p:cNvPr id="42" name="Picture 41" descr="Diagram, map&#10;&#10;Description automatically generated">
+                <a:extLst>
+                  <a:ext uri="{FF2B5EF4-FFF2-40B4-BE49-F238E27FC236}">
+                    <a16:creationId xmlns:a16="http://schemas.microsoft.com/office/drawing/2014/main" id="{189CD6F8-E2B1-EEB8-5E7D-61231C04482A}"/>
+                  </a:ext>
+                </a:extLst>
+              </p:cNvPr>
+              <p:cNvPicPr>
+                <a:picLocks noChangeAspect="1"/>
+              </p:cNvPicPr>
+              <p:nvPr/>
+            </p:nvPicPr>
+            <p:blipFill rotWithShape="1">
+              <a:blip r:embed="rId7">
+                <a:extLst>
+                  <a:ext uri="{28A0092B-C50C-407E-A947-70E740481C1C}">
+                    <a14:useLocalDpi xmlns:a14="http://schemas.microsoft.com/office/drawing/2010/main" val="0"/>
+                  </a:ext>
+                </a:extLst>
+              </a:blip>
+              <a:srcRect l="26440" t="23435" r="35423" b="23116"/>
+              <a:stretch/>
+            </p:blipFill>
+            <p:spPr>
+              <a:xfrm>
+                <a:off x="6086168" y="3664610"/>
+                <a:ext cx="2487561" cy="2694039"/>
+              </a:xfrm>
+              <a:prstGeom prst="rect">
+                <a:avLst/>
+              </a:prstGeom>
+              <a:ln w="12700">
+                <a:solidFill>
+                  <a:schemeClr val="tx1"/>
+                </a:solidFill>
+              </a:ln>
+            </p:spPr>
+          </p:pic>
+          <p:pic>
+            <p:nvPicPr>
+              <p:cNvPr id="43" name="Picture 42" descr="Diagram, map&#10;&#10;Description automatically generated">
+                <a:extLst>
+                  <a:ext uri="{FF2B5EF4-FFF2-40B4-BE49-F238E27FC236}">
+                    <a16:creationId xmlns:a16="http://schemas.microsoft.com/office/drawing/2014/main" id="{C10CA7C7-C7FA-4030-7D5F-E95FD970C2E9}"/>
+                  </a:ext>
+                </a:extLst>
+              </p:cNvPr>
+              <p:cNvPicPr>
+                <a:picLocks noChangeAspect="1"/>
+              </p:cNvPicPr>
+              <p:nvPr/>
+            </p:nvPicPr>
+            <p:blipFill rotWithShape="1">
+              <a:blip r:embed="rId7">
+                <a:extLst>
+                  <a:ext uri="{28A0092B-C50C-407E-A947-70E740481C1C}">
+                    <a14:useLocalDpi xmlns:a14="http://schemas.microsoft.com/office/drawing/2010/main" val="0"/>
+                  </a:ext>
+                </a:extLst>
+              </a:blip>
+              <a:srcRect l="68119" t="83224" r="4598" b="5267"/>
+              <a:stretch/>
+            </p:blipFill>
+            <p:spPr>
+              <a:xfrm>
+                <a:off x="6794089" y="5763795"/>
+                <a:ext cx="1779640" cy="580105"/>
+              </a:xfrm>
+              <a:prstGeom prst="rect">
+                <a:avLst/>
+              </a:prstGeom>
+            </p:spPr>
+          </p:pic>
+        </p:grpSp>
+      </p:grpSp>
+    </p:spTree>
+    <p:extLst>
+      <p:ext uri="{BB962C8B-B14F-4D97-AF65-F5344CB8AC3E}">
+        <p14:creationId xmlns:p14="http://schemas.microsoft.com/office/powerpoint/2010/main" val="1466399577"/>
+      </p:ext>
+    </p:extLst>
+  </p:cSld>
+  <p:clrMapOvr>
+    <a:masterClrMapping/>
+  </p:clrMapOvr>
+</p:sld>
+</file>
+
+<file path=ppt/slides/slide2.xml><?xml version="1.0" encoding="utf-8"?>
+<p:sld xmlns:a="http://schemas.openxmlformats.org/drawingml/2006/main" xmlns:r="http://schemas.openxmlformats.org/officeDocument/2006/relationships" xmlns:p="http://schemas.openxmlformats.org/presentationml/2006/main">
+  <p:cSld>
+    <p:spTree>
+      <p:nvGrpSpPr>
+        <p:cNvPr id="1" name=""/>
+        <p:cNvGrpSpPr/>
+        <p:nvPr/>
+      </p:nvGrpSpPr>
+      <p:grpSpPr>
+        <a:xfrm>
+          <a:off x="0" y="0"/>
+          <a:ext cx="0" cy="0"/>
+          <a:chOff x="0" y="0"/>
+          <a:chExt cx="0" cy="0"/>
+        </a:xfrm>
+      </p:grpSpPr>
+      <p:grpSp>
+        <p:nvGrpSpPr>
+          <p:cNvPr id="28" name="Group 27">
+            <a:extLst>
+              <a:ext uri="{FF2B5EF4-FFF2-40B4-BE49-F238E27FC236}">
+                <a16:creationId xmlns:a16="http://schemas.microsoft.com/office/drawing/2014/main" id="{009E6C1E-7233-7AB4-F38D-29109B5A39D1}"/>
+              </a:ext>
+            </a:extLst>
+          </p:cNvPr>
+          <p:cNvGrpSpPr/>
+          <p:nvPr/>
+        </p:nvGrpSpPr>
+        <p:grpSpPr>
+          <a:xfrm>
+            <a:off x="619433" y="515565"/>
+            <a:ext cx="11361693" cy="6131928"/>
+            <a:chOff x="619433" y="515565"/>
+            <a:chExt cx="11361693" cy="6131928"/>
+          </a:xfrm>
+        </p:grpSpPr>
+        <p:pic>
+          <p:nvPicPr>
+            <p:cNvPr id="3" name="Graphic 2">
+              <a:extLst>
+                <a:ext uri="{FF2B5EF4-FFF2-40B4-BE49-F238E27FC236}">
+                  <a16:creationId xmlns:a16="http://schemas.microsoft.com/office/drawing/2014/main" id="{F28BD36F-B7CD-6075-2CCD-36FE929B84C4}"/>
+                </a:ext>
+              </a:extLst>
+            </p:cNvPr>
+            <p:cNvPicPr>
+              <a:picLocks noChangeAspect="1"/>
+            </p:cNvPicPr>
+            <p:nvPr/>
+          </p:nvPicPr>
+          <p:blipFill rotWithShape="1">
+            <a:blip r:embed="rId2">
+              <a:extLst>
+                <a:ext uri="{28A0092B-C50C-407E-A947-70E740481C1C}">
+                  <a14:useLocalDpi xmlns:a14="http://schemas.microsoft.com/office/drawing/2010/main" val="0"/>
+                </a:ext>
+                <a:ext uri="{96DAC541-7B7A-43D3-8B79-37D633B846F1}">
+                  <asvg:svgBlip xmlns:asvg="http://schemas.microsoft.com/office/drawing/2016/SVG/main" r:embed="rId3"/>
+                </a:ext>
+              </a:extLst>
+            </a:blip>
+            <a:srcRect l="6240" t="11183" r="5021" b="20426"/>
+            <a:stretch/>
+          </p:blipFill>
+          <p:spPr>
+            <a:xfrm>
+              <a:off x="629265" y="766916"/>
+              <a:ext cx="7875638" cy="4690301"/>
+            </a:xfrm>
+            <a:prstGeom prst="rect">
+              <a:avLst/>
+            </a:prstGeom>
+          </p:spPr>
+        </p:pic>
+        <p:pic>
+          <p:nvPicPr>
+            <p:cNvPr id="6" name="Graphic 5">
+              <a:extLst>
+                <a:ext uri="{FF2B5EF4-FFF2-40B4-BE49-F238E27FC236}">
+                  <a16:creationId xmlns:a16="http://schemas.microsoft.com/office/drawing/2014/main" id="{1E33B6FB-6B5B-D05B-7711-742C46182584}"/>
+                </a:ext>
+              </a:extLst>
+            </p:cNvPr>
+            <p:cNvPicPr>
+              <a:picLocks noChangeAspect="1"/>
+            </p:cNvPicPr>
+            <p:nvPr/>
+          </p:nvPicPr>
+          <p:blipFill rotWithShape="1">
+            <a:blip r:embed="rId4">
+              <a:extLst>
+                <a:ext uri="{28A0092B-C50C-407E-A947-70E740481C1C}">
+                  <a14:useLocalDpi xmlns:a14="http://schemas.microsoft.com/office/drawing/2010/main" val="0"/>
+                </a:ext>
+                <a:ext uri="{96DAC541-7B7A-43D3-8B79-37D633B846F1}">
+                  <asvg:svgBlip xmlns:asvg="http://schemas.microsoft.com/office/drawing/2016/SVG/main" r:embed="rId5"/>
+                </a:ext>
+              </a:extLst>
+            </a:blip>
+            <a:srcRect l="67670" t="82796" b="5735"/>
+            <a:stretch/>
+          </p:blipFill>
+          <p:spPr>
+            <a:xfrm>
+              <a:off x="619433" y="5599182"/>
+              <a:ext cx="2743200" cy="752018"/>
+            </a:xfrm>
+            <a:prstGeom prst="rect">
+              <a:avLst/>
+            </a:prstGeom>
+          </p:spPr>
+        </p:pic>
+        <p:pic>
+          <p:nvPicPr>
+            <p:cNvPr id="7" name="Picture 6" descr="Diagram, map&#10;&#10;Description automatically generated">
+              <a:extLst>
+                <a:ext uri="{FF2B5EF4-FFF2-40B4-BE49-F238E27FC236}">
+                  <a16:creationId xmlns:a16="http://schemas.microsoft.com/office/drawing/2014/main" id="{8DCE6C51-8421-0C0A-4F7B-1F131985BE2F}"/>
+                </a:ext>
+              </a:extLst>
+            </p:cNvPr>
+            <p:cNvPicPr>
+              <a:picLocks noChangeAspect="1"/>
+            </p:cNvPicPr>
+            <p:nvPr/>
+          </p:nvPicPr>
+          <p:blipFill rotWithShape="1">
+            <a:blip r:embed="rId6">
+              <a:extLst>
+                <a:ext uri="{28A0092B-C50C-407E-A947-70E740481C1C}">
+                  <a14:useLocalDpi xmlns:a14="http://schemas.microsoft.com/office/drawing/2010/main" val="0"/>
+                </a:ext>
+              </a:extLst>
+            </a:blip>
+            <a:srcRect l="31622" t="24170" r="39222" b="31308"/>
+            <a:stretch/>
+          </p:blipFill>
+          <p:spPr>
+            <a:xfrm>
+              <a:off x="6096000" y="3594160"/>
+              <a:ext cx="2587557" cy="3053333"/>
+            </a:xfrm>
+            <a:prstGeom prst="rect">
+              <a:avLst/>
+            </a:prstGeom>
+            <a:ln w="12700">
+              <a:solidFill>
+                <a:schemeClr val="tx1"/>
+              </a:solidFill>
+            </a:ln>
+          </p:spPr>
+        </p:pic>
+        <p:pic>
+          <p:nvPicPr>
+            <p:cNvPr id="8" name="Picture 7" descr="Diagram, map&#10;&#10;Description automatically generated">
+              <a:extLst>
+                <a:ext uri="{FF2B5EF4-FFF2-40B4-BE49-F238E27FC236}">
+                  <a16:creationId xmlns:a16="http://schemas.microsoft.com/office/drawing/2014/main" id="{0C642524-AE0D-517E-25A3-F825185123E6}"/>
+                </a:ext>
+              </a:extLst>
+            </p:cNvPr>
+            <p:cNvPicPr>
+              <a:picLocks noChangeAspect="1"/>
+            </p:cNvPicPr>
+            <p:nvPr/>
+          </p:nvPicPr>
+          <p:blipFill rotWithShape="1">
+            <a:blip r:embed="rId6">
+              <a:extLst>
+                <a:ext uri="{28A0092B-C50C-407E-A947-70E740481C1C}">
+                  <a14:useLocalDpi xmlns:a14="http://schemas.microsoft.com/office/drawing/2010/main" val="0"/>
+                </a:ext>
+              </a:extLst>
+            </a:blip>
+            <a:srcRect l="68049" t="83310" b="5626"/>
+            <a:stretch/>
+          </p:blipFill>
+          <p:spPr>
+            <a:xfrm>
+              <a:off x="9145418" y="5754821"/>
+              <a:ext cx="2835708" cy="758758"/>
+            </a:xfrm>
+            <a:prstGeom prst="rect">
+              <a:avLst/>
+            </a:prstGeom>
+          </p:spPr>
+        </p:pic>
+        <p:pic>
+          <p:nvPicPr>
+            <p:cNvPr id="18" name="Picture 17" descr="Map&#10;&#10;Description automatically generated">
+              <a:extLst>
+                <a:ext uri="{FF2B5EF4-FFF2-40B4-BE49-F238E27FC236}">
+                  <a16:creationId xmlns:a16="http://schemas.microsoft.com/office/drawing/2014/main" id="{3FF7FD22-8271-3EA2-67CF-6494F503D2E6}"/>
+                </a:ext>
+              </a:extLst>
+            </p:cNvPr>
+            <p:cNvPicPr>
+              <a:picLocks noChangeAspect="1"/>
+            </p:cNvPicPr>
+            <p:nvPr/>
+          </p:nvPicPr>
+          <p:blipFill rotWithShape="1">
+            <a:blip r:embed="rId7">
+              <a:extLst>
+                <a:ext uri="{28A0092B-C50C-407E-A947-70E740481C1C}">
+                  <a14:useLocalDpi xmlns:a14="http://schemas.microsoft.com/office/drawing/2010/main" val="0"/>
+                </a:ext>
+              </a:extLst>
+            </a:blip>
+            <a:srcRect l="29765" t="19166" r="39556" b="39766"/>
+            <a:stretch/>
+          </p:blipFill>
+          <p:spPr>
+            <a:xfrm>
+              <a:off x="7180058" y="515566"/>
+              <a:ext cx="2722699" cy="2816368"/>
+            </a:xfrm>
+            <a:prstGeom prst="rect">
+              <a:avLst/>
+            </a:prstGeom>
+            <a:ln w="12700">
+              <a:solidFill>
+                <a:schemeClr val="tx1"/>
+              </a:solidFill>
+            </a:ln>
+          </p:spPr>
+        </p:pic>
+        <p:pic>
+          <p:nvPicPr>
+            <p:cNvPr id="21" name="Picture 20" descr="Map&#10;&#10;Description automatically generated">
+              <a:extLst>
+                <a:ext uri="{FF2B5EF4-FFF2-40B4-BE49-F238E27FC236}">
+                  <a16:creationId xmlns:a16="http://schemas.microsoft.com/office/drawing/2014/main" id="{465239D7-E493-0331-1FA2-FBA2CFCF525B}"/>
+                </a:ext>
+              </a:extLst>
+            </p:cNvPr>
+            <p:cNvPicPr>
+              <a:picLocks noChangeAspect="1"/>
+            </p:cNvPicPr>
+            <p:nvPr/>
+          </p:nvPicPr>
+          <p:blipFill rotWithShape="1">
+            <a:blip r:embed="rId7">
+              <a:extLst>
+                <a:ext uri="{28A0092B-C50C-407E-A947-70E740481C1C}">
+                  <a14:useLocalDpi xmlns:a14="http://schemas.microsoft.com/office/drawing/2010/main" val="0"/>
+                </a:ext>
+              </a:extLst>
+            </a:blip>
+            <a:srcRect l="68049" t="83073" b="5154"/>
+            <a:stretch/>
+          </p:blipFill>
+          <p:spPr>
+            <a:xfrm>
+              <a:off x="9145418" y="3429000"/>
+              <a:ext cx="2835708" cy="807396"/>
+            </a:xfrm>
+            <a:prstGeom prst="rect">
+              <a:avLst/>
+            </a:prstGeom>
+          </p:spPr>
+        </p:pic>
+        <p:sp>
+          <p:nvSpPr>
+            <p:cNvPr id="26" name="Freeform: Shape 25">
+              <a:extLst>
+                <a:ext uri="{FF2B5EF4-FFF2-40B4-BE49-F238E27FC236}">
+                  <a16:creationId xmlns:a16="http://schemas.microsoft.com/office/drawing/2014/main" id="{142F0B8F-8BA9-6727-A917-2BBAEFE0B3A2}"/>
+                </a:ext>
+              </a:extLst>
+            </p:cNvPr>
+            <p:cNvSpPr/>
+            <p:nvPr/>
+          </p:nvSpPr>
+          <p:spPr>
+            <a:xfrm>
+              <a:off x="3529780" y="515565"/>
+              <a:ext cx="3650278" cy="2816368"/>
+            </a:xfrm>
+            <a:custGeom>
+              <a:avLst/>
+              <a:gdLst>
+                <a:gd name="connsiteX0" fmla="*/ 0 w 3588774"/>
+                <a:gd name="connsiteY0" fmla="*/ 973393 h 2428568"/>
+                <a:gd name="connsiteX1" fmla="*/ 98322 w 3588774"/>
+                <a:gd name="connsiteY1" fmla="*/ 1061884 h 2428568"/>
+                <a:gd name="connsiteX2" fmla="*/ 58993 w 3588774"/>
+                <a:gd name="connsiteY2" fmla="*/ 1219200 h 2428568"/>
+                <a:gd name="connsiteX3" fmla="*/ 3588774 w 3588774"/>
+                <a:gd name="connsiteY3" fmla="*/ 2428568 h 2428568"/>
+                <a:gd name="connsiteX4" fmla="*/ 3588774 w 3588774"/>
+                <a:gd name="connsiteY4" fmla="*/ 0 h 2428568"/>
+                <a:gd name="connsiteX5" fmla="*/ 0 w 3588774"/>
+                <a:gd name="connsiteY5" fmla="*/ 973393 h 2428568"/>
+              </a:gdLst>
+              <a:ahLst/>
+              <a:cxnLst>
+                <a:cxn ang="0">
+                  <a:pos x="connsiteX0" y="connsiteY0"/>
+                </a:cxn>
+                <a:cxn ang="0">
+                  <a:pos x="connsiteX1" y="connsiteY1"/>
+                </a:cxn>
+                <a:cxn ang="0">
+                  <a:pos x="connsiteX2" y="connsiteY2"/>
+                </a:cxn>
+                <a:cxn ang="0">
+                  <a:pos x="connsiteX3" y="connsiteY3"/>
+                </a:cxn>
+                <a:cxn ang="0">
+                  <a:pos x="connsiteX4" y="connsiteY4"/>
+                </a:cxn>
+                <a:cxn ang="0">
+                  <a:pos x="connsiteX5" y="connsiteY5"/>
+                </a:cxn>
+              </a:cxnLst>
+              <a:rect l="l" t="t" r="r" b="b"/>
+              <a:pathLst>
+                <a:path w="3588774" h="2428568">
+                  <a:moveTo>
+                    <a:pt x="0" y="973393"/>
+                  </a:moveTo>
+                  <a:lnTo>
+                    <a:pt x="98322" y="1061884"/>
+                  </a:lnTo>
+                  <a:lnTo>
+                    <a:pt x="58993" y="1219200"/>
+                  </a:lnTo>
+                  <a:lnTo>
+                    <a:pt x="3588774" y="2428568"/>
+                  </a:lnTo>
+                  <a:lnTo>
+                    <a:pt x="3588774" y="0"/>
+                  </a:lnTo>
+                  <a:lnTo>
+                    <a:pt x="0" y="973393"/>
+                  </a:lnTo>
+                  <a:close/>
+                </a:path>
+              </a:pathLst>
+            </a:custGeom>
+            <a:solidFill>
+              <a:schemeClr val="accent5">
+                <a:alpha val="20000"/>
+              </a:schemeClr>
+            </a:solidFill>
+            <a:ln>
+              <a:noFill/>
+            </a:ln>
+          </p:spPr>
+          <p:style>
+            <a:lnRef idx="2">
+              <a:schemeClr val="accent1">
+                <a:shade val="50000"/>
+              </a:schemeClr>
+            </a:lnRef>
+            <a:fillRef idx="1">
+              <a:schemeClr val="accent1"/>
+            </a:fillRef>
+            <a:effectRef idx="0">
+              <a:schemeClr val="accent1"/>
+            </a:effectRef>
+            <a:fontRef idx="minor">
+              <a:schemeClr val="lt1"/>
+            </a:fontRef>
+          </p:style>
+          <p:txBody>
+            <a:bodyPr rtlCol="0" anchor="ctr"/>
+            <a:lstStyle/>
+            <a:p>
+              <a:pPr algn="ctr"/>
+              <a:endParaRPr lang="en-US" dirty="0"/>
+            </a:p>
+          </p:txBody>
+        </p:sp>
+        <p:sp>
+          <p:nvSpPr>
+            <p:cNvPr id="27" name="Freeform: Shape 26">
+              <a:extLst>
+                <a:ext uri="{FF2B5EF4-FFF2-40B4-BE49-F238E27FC236}">
+                  <a16:creationId xmlns:a16="http://schemas.microsoft.com/office/drawing/2014/main" id="{62693893-CED0-FF18-0EBD-FBF89C9C3E8D}"/>
+                </a:ext>
+              </a:extLst>
+            </p:cNvPr>
+            <p:cNvSpPr/>
+            <p:nvPr/>
+          </p:nvSpPr>
+          <p:spPr>
+            <a:xfrm>
+              <a:off x="2762551" y="3594159"/>
+              <a:ext cx="3333449" cy="3053333"/>
+            </a:xfrm>
+            <a:custGeom>
+              <a:avLst/>
+              <a:gdLst>
+                <a:gd name="connsiteX0" fmla="*/ 58993 w 3352800"/>
+                <a:gd name="connsiteY0" fmla="*/ 383458 h 2939845"/>
+                <a:gd name="connsiteX1" fmla="*/ 3352800 w 3352800"/>
+                <a:gd name="connsiteY1" fmla="*/ 0 h 2939845"/>
+                <a:gd name="connsiteX2" fmla="*/ 3352800 w 3352800"/>
+                <a:gd name="connsiteY2" fmla="*/ 2939845 h 2939845"/>
+                <a:gd name="connsiteX3" fmla="*/ 0 w 3352800"/>
+                <a:gd name="connsiteY3" fmla="*/ 580103 h 2939845"/>
+                <a:gd name="connsiteX4" fmla="*/ 88490 w 3352800"/>
+                <a:gd name="connsiteY4" fmla="*/ 491612 h 2939845"/>
+                <a:gd name="connsiteX5" fmla="*/ 58993 w 3352800"/>
+                <a:gd name="connsiteY5" fmla="*/ 383458 h 2939845"/>
+                <a:gd name="connsiteX0" fmla="*/ 58993 w 3352800"/>
+                <a:gd name="connsiteY0" fmla="*/ 393290 h 2949677"/>
+                <a:gd name="connsiteX1" fmla="*/ 3352800 w 3352800"/>
+                <a:gd name="connsiteY1" fmla="*/ 0 h 2949677"/>
+                <a:gd name="connsiteX2" fmla="*/ 3352800 w 3352800"/>
+                <a:gd name="connsiteY2" fmla="*/ 2949677 h 2949677"/>
+                <a:gd name="connsiteX3" fmla="*/ 0 w 3352800"/>
+                <a:gd name="connsiteY3" fmla="*/ 589935 h 2949677"/>
+                <a:gd name="connsiteX4" fmla="*/ 88490 w 3352800"/>
+                <a:gd name="connsiteY4" fmla="*/ 501444 h 2949677"/>
+                <a:gd name="connsiteX5" fmla="*/ 58993 w 3352800"/>
+                <a:gd name="connsiteY5" fmla="*/ 393290 h 2949677"/>
+                <a:gd name="connsiteX0" fmla="*/ 58993 w 3352800"/>
+                <a:gd name="connsiteY0" fmla="*/ 393290 h 2959509"/>
+                <a:gd name="connsiteX1" fmla="*/ 3352800 w 3352800"/>
+                <a:gd name="connsiteY1" fmla="*/ 0 h 2959509"/>
+                <a:gd name="connsiteX2" fmla="*/ 3352800 w 3352800"/>
+                <a:gd name="connsiteY2" fmla="*/ 2959509 h 2959509"/>
+                <a:gd name="connsiteX3" fmla="*/ 0 w 3352800"/>
+                <a:gd name="connsiteY3" fmla="*/ 589935 h 2959509"/>
+                <a:gd name="connsiteX4" fmla="*/ 88490 w 3352800"/>
+                <a:gd name="connsiteY4" fmla="*/ 501444 h 2959509"/>
+                <a:gd name="connsiteX5" fmla="*/ 58993 w 3352800"/>
+                <a:gd name="connsiteY5" fmla="*/ 393290 h 2959509"/>
+                <a:gd name="connsiteX0" fmla="*/ 58993 w 3352800"/>
+                <a:gd name="connsiteY0" fmla="*/ 393290 h 2703870"/>
+                <a:gd name="connsiteX1" fmla="*/ 3352800 w 3352800"/>
+                <a:gd name="connsiteY1" fmla="*/ 0 h 2703870"/>
+                <a:gd name="connsiteX2" fmla="*/ 3342968 w 3352800"/>
+                <a:gd name="connsiteY2" fmla="*/ 2703870 h 2703870"/>
+                <a:gd name="connsiteX3" fmla="*/ 0 w 3352800"/>
+                <a:gd name="connsiteY3" fmla="*/ 589935 h 2703870"/>
+                <a:gd name="connsiteX4" fmla="*/ 88490 w 3352800"/>
+                <a:gd name="connsiteY4" fmla="*/ 501444 h 2703870"/>
+                <a:gd name="connsiteX5" fmla="*/ 58993 w 3352800"/>
+                <a:gd name="connsiteY5" fmla="*/ 393290 h 2703870"/>
+              </a:gdLst>
+              <a:ahLst/>
+              <a:cxnLst>
+                <a:cxn ang="0">
+                  <a:pos x="connsiteX0" y="connsiteY0"/>
+                </a:cxn>
+                <a:cxn ang="0">
+                  <a:pos x="connsiteX1" y="connsiteY1"/>
+                </a:cxn>
+                <a:cxn ang="0">
+                  <a:pos x="connsiteX2" y="connsiteY2"/>
+                </a:cxn>
+                <a:cxn ang="0">
+                  <a:pos x="connsiteX3" y="connsiteY3"/>
+                </a:cxn>
+                <a:cxn ang="0">
+                  <a:pos x="connsiteX4" y="connsiteY4"/>
+                </a:cxn>
+                <a:cxn ang="0">
+                  <a:pos x="connsiteX5" y="connsiteY5"/>
+                </a:cxn>
+              </a:cxnLst>
+              <a:rect l="l" t="t" r="r" b="b"/>
+              <a:pathLst>
+                <a:path w="3352800" h="2703870">
+                  <a:moveTo>
+                    <a:pt x="58993" y="393290"/>
+                  </a:moveTo>
+                  <a:lnTo>
+                    <a:pt x="3352800" y="0"/>
+                  </a:lnTo>
+                  <a:cubicBezTo>
+                    <a:pt x="3349523" y="901290"/>
+                    <a:pt x="3346245" y="1802580"/>
+                    <a:pt x="3342968" y="2703870"/>
+                  </a:cubicBezTo>
+                  <a:lnTo>
+                    <a:pt x="0" y="589935"/>
+                  </a:lnTo>
+                  <a:lnTo>
+                    <a:pt x="88490" y="501444"/>
+                  </a:lnTo>
+                  <a:lnTo>
+                    <a:pt x="58993" y="393290"/>
+                  </a:lnTo>
+                  <a:close/>
+                </a:path>
+              </a:pathLst>
+            </a:custGeom>
+            <a:solidFill>
+              <a:srgbClr val="C00000">
+                <a:alpha val="20000"/>
+              </a:srgbClr>
+            </a:solidFill>
+            <a:ln>
+              <a:noFill/>
+            </a:ln>
+          </p:spPr>
+          <p:style>
+            <a:lnRef idx="2">
+              <a:schemeClr val="accent1">
+                <a:shade val="50000"/>
+              </a:schemeClr>
+            </a:lnRef>
+            <a:fillRef idx="1">
+              <a:schemeClr val="accent1"/>
+            </a:fillRef>
+            <a:effectRef idx="0">
+              <a:schemeClr val="accent1"/>
+            </a:effectRef>
+            <a:fontRef idx="minor">
+              <a:schemeClr val="lt1"/>
+            </a:fontRef>
+          </p:style>
+          <p:txBody>
+            <a:bodyPr rtlCol="0" anchor="ctr"/>
+            <a:lstStyle/>
+            <a:p>
+              <a:pPr algn="ctr"/>
+              <a:endParaRPr lang="en-US"/>
+            </a:p>
+          </p:txBody>
+        </p:sp>
+      </p:grpSp>
+    </p:spTree>
+    <p:extLst>
+      <p:ext uri="{BB962C8B-B14F-4D97-AF65-F5344CB8AC3E}">
+        <p14:creationId xmlns:p14="http://schemas.microsoft.com/office/powerpoint/2010/main" val="4087936674"/>
+      </p:ext>
+    </p:extLst>
+  </p:cSld>
+  <p:clrMapOvr>
+    <a:masterClrMapping/>
+  </p:clrMapOvr>
+</p:sld>
+</file>
+
+<file path=ppt/slides/slide3.xml><?xml version="1.0" encoding="utf-8"?>
+<p:sld xmlns:a="http://schemas.openxmlformats.org/drawingml/2006/main" xmlns:r="http://schemas.openxmlformats.org/officeDocument/2006/relationships" xmlns:p="http://schemas.openxmlformats.org/presentationml/2006/main">
+  <p:cSld>
+    <p:spTree>
+      <p:nvGrpSpPr>
+        <p:cNvPr id="1" name=""/>
+        <p:cNvGrpSpPr/>
+        <p:nvPr/>
+      </p:nvGrpSpPr>
+      <p:grpSpPr>
+        <a:xfrm>
+          <a:off x="0" y="0"/>
+          <a:ext cx="0" cy="0"/>
+          <a:chOff x="0" y="0"/>
+          <a:chExt cx="0" cy="0"/>
+        </a:xfrm>
+      </p:grpSpPr>
+      <p:pic>
+        <p:nvPicPr>
+          <p:cNvPr id="3" name="Graphic 2">
+            <a:extLst>
+              <a:ext uri="{FF2B5EF4-FFF2-40B4-BE49-F238E27FC236}">
+                <a16:creationId xmlns:a16="http://schemas.microsoft.com/office/drawing/2014/main" id="{F28BD36F-B7CD-6075-2CCD-36FE929B84C4}"/>
+              </a:ext>
+            </a:extLst>
+          </p:cNvPr>
+          <p:cNvPicPr>
+            <a:picLocks noChangeAspect="1"/>
+          </p:cNvPicPr>
+          <p:nvPr/>
+        </p:nvPicPr>
+        <p:blipFill rotWithShape="1">
+          <a:blip r:embed="rId2">
+            <a:extLst>
+              <a:ext uri="{28A0092B-C50C-407E-A947-70E740481C1C}">
+                <a14:useLocalDpi xmlns:a14="http://schemas.microsoft.com/office/drawing/2010/main" val="0"/>
+              </a:ext>
+              <a:ext uri="{96DAC541-7B7A-43D3-8B79-37D633B846F1}">
+                <asvg:svgBlip xmlns:asvg="http://schemas.microsoft.com/office/drawing/2016/SVG/main" r:embed="rId3"/>
+              </a:ext>
+            </a:extLst>
+          </a:blip>
+          <a:srcRect l="6240" t="11183" r="5021" b="20426"/>
+          <a:stretch/>
+        </p:blipFill>
+        <p:spPr>
+          <a:xfrm>
+            <a:off x="629265" y="766916"/>
+            <a:ext cx="7875638" cy="4690301"/>
+          </a:xfrm>
+          <a:prstGeom prst="rect">
+            <a:avLst/>
+          </a:prstGeom>
+        </p:spPr>
+      </p:pic>
+      <p:pic>
+        <p:nvPicPr>
+          <p:cNvPr id="6" name="Graphic 5">
+            <a:extLst>
+              <a:ext uri="{FF2B5EF4-FFF2-40B4-BE49-F238E27FC236}">
+                <a16:creationId xmlns:a16="http://schemas.microsoft.com/office/drawing/2014/main" id="{1E33B6FB-6B5B-D05B-7711-742C46182584}"/>
+              </a:ext>
+            </a:extLst>
+          </p:cNvPr>
+          <p:cNvPicPr>
+            <a:picLocks noChangeAspect="1"/>
+          </p:cNvPicPr>
+          <p:nvPr/>
+        </p:nvPicPr>
+        <p:blipFill rotWithShape="1">
+          <a:blip r:embed="rId4">
+            <a:extLst>
+              <a:ext uri="{28A0092B-C50C-407E-A947-70E740481C1C}">
+                <a14:useLocalDpi xmlns:a14="http://schemas.microsoft.com/office/drawing/2010/main" val="0"/>
+              </a:ext>
+              <a:ext uri="{96DAC541-7B7A-43D3-8B79-37D633B846F1}">
+                <asvg:svgBlip xmlns:asvg="http://schemas.microsoft.com/office/drawing/2016/SVG/main" r:embed="rId5"/>
+              </a:ext>
+            </a:extLst>
+          </a:blip>
+          <a:srcRect l="67670" t="82796" b="5735"/>
+          <a:stretch/>
+        </p:blipFill>
+        <p:spPr>
+          <a:xfrm>
+            <a:off x="619433" y="5599182"/>
+            <a:ext cx="2743200" cy="752018"/>
+          </a:xfrm>
+          <a:prstGeom prst="rect">
+            <a:avLst/>
+          </a:prstGeom>
+        </p:spPr>
+      </p:pic>
+      <p:cxnSp>
+        <p:nvCxnSpPr>
+          <p:cNvPr id="9" name="Straight Connector 8">
+            <a:extLst>
+              <a:ext uri="{FF2B5EF4-FFF2-40B4-BE49-F238E27FC236}">
+                <a16:creationId xmlns:a16="http://schemas.microsoft.com/office/drawing/2014/main" id="{DEB7DF72-6724-A427-79ED-5CE7FB312D08}"/>
+              </a:ext>
+            </a:extLst>
+          </p:cNvPr>
+          <p:cNvCxnSpPr>
+            <a:cxnSpLocks/>
+          </p:cNvCxnSpPr>
+          <p:nvPr/>
+        </p:nvCxnSpPr>
+        <p:spPr>
+          <a:xfrm flipV="1">
+            <a:off x="3510116" y="515566"/>
+            <a:ext cx="3640706" cy="1116589"/>
+          </a:xfrm>
+          <a:prstGeom prst="line">
+            <a:avLst/>
+          </a:prstGeom>
+          <a:ln w="12700">
+            <a:solidFill>
+              <a:schemeClr val="tx1"/>
+            </a:solidFill>
+          </a:ln>
+        </p:spPr>
+        <p:style>
+          <a:lnRef idx="1">
+            <a:schemeClr val="accent1"/>
+          </a:lnRef>
+          <a:fillRef idx="0">
+            <a:schemeClr val="accent1"/>
+          </a:fillRef>
+          <a:effectRef idx="0">
+            <a:schemeClr val="accent1"/>
+          </a:effectRef>
+          <a:fontRef idx="minor">
+            <a:schemeClr val="tx1"/>
+          </a:fontRef>
+        </p:style>
+      </p:cxnSp>
+      <p:cxnSp>
+        <p:nvCxnSpPr>
+          <p:cNvPr id="16" name="Straight Connector 15">
+            <a:extLst>
+              <a:ext uri="{FF2B5EF4-FFF2-40B4-BE49-F238E27FC236}">
+                <a16:creationId xmlns:a16="http://schemas.microsoft.com/office/drawing/2014/main" id="{B584049A-B37F-EA4F-D9BB-F27788189751}"/>
+              </a:ext>
+            </a:extLst>
+          </p:cNvPr>
+          <p:cNvCxnSpPr>
+            <a:cxnSpLocks/>
+          </p:cNvCxnSpPr>
+          <p:nvPr/>
+        </p:nvCxnSpPr>
+        <p:spPr>
+          <a:xfrm>
+            <a:off x="3510116" y="2012791"/>
+            <a:ext cx="3669941" cy="1319143"/>
+          </a:xfrm>
+          <a:prstGeom prst="line">
+            <a:avLst/>
+          </a:prstGeom>
+          <a:ln w="12700">
+            <a:solidFill>
+              <a:schemeClr val="tx1"/>
+            </a:solidFill>
+          </a:ln>
+        </p:spPr>
+        <p:style>
+          <a:lnRef idx="1">
+            <a:schemeClr val="accent1"/>
+          </a:lnRef>
+          <a:fillRef idx="0">
+            <a:schemeClr val="accent1"/>
+          </a:fillRef>
+          <a:effectRef idx="0">
+            <a:schemeClr val="accent1"/>
+          </a:effectRef>
+          <a:fontRef idx="minor">
+            <a:schemeClr val="tx1"/>
+          </a:fontRef>
+        </p:style>
+      </p:cxnSp>
+      <p:cxnSp>
+        <p:nvCxnSpPr>
+          <p:cNvPr id="19" name="Straight Connector 18">
+            <a:extLst>
+              <a:ext uri="{FF2B5EF4-FFF2-40B4-BE49-F238E27FC236}">
+                <a16:creationId xmlns:a16="http://schemas.microsoft.com/office/drawing/2014/main" id="{07F300E4-0FEE-D1CD-C259-98EE512C47C2}"/>
+              </a:ext>
+            </a:extLst>
+          </p:cNvPr>
+          <p:cNvCxnSpPr>
+            <a:cxnSpLocks/>
+          </p:cNvCxnSpPr>
+          <p:nvPr/>
+        </p:nvCxnSpPr>
+        <p:spPr>
+          <a:xfrm flipV="1">
+            <a:off x="2809569" y="3571203"/>
+            <a:ext cx="3286431" cy="464940"/>
+          </a:xfrm>
+          <a:prstGeom prst="line">
+            <a:avLst/>
+          </a:prstGeom>
+          <a:ln w="12700">
+            <a:solidFill>
+              <a:schemeClr val="tx1"/>
+            </a:solidFill>
+          </a:ln>
+        </p:spPr>
+        <p:style>
+          <a:lnRef idx="1">
+            <a:schemeClr val="accent1"/>
+          </a:lnRef>
+          <a:fillRef idx="0">
+            <a:schemeClr val="accent1"/>
+          </a:fillRef>
+          <a:effectRef idx="0">
+            <a:schemeClr val="accent1"/>
+          </a:effectRef>
+          <a:fontRef idx="minor">
+            <a:schemeClr val="tx1"/>
+          </a:fontRef>
+        </p:style>
+      </p:cxnSp>
+      <p:cxnSp>
+        <p:nvCxnSpPr>
+          <p:cNvPr id="20" name="Straight Connector 19">
+            <a:extLst>
+              <a:ext uri="{FF2B5EF4-FFF2-40B4-BE49-F238E27FC236}">
+                <a16:creationId xmlns:a16="http://schemas.microsoft.com/office/drawing/2014/main" id="{A13C41B1-F930-102B-C697-875B101686C6}"/>
+              </a:ext>
+            </a:extLst>
+          </p:cNvPr>
+          <p:cNvCxnSpPr>
+            <a:cxnSpLocks/>
+          </p:cNvCxnSpPr>
+          <p:nvPr/>
+        </p:nvCxnSpPr>
+        <p:spPr>
+          <a:xfrm>
+            <a:off x="2809569" y="4296697"/>
+            <a:ext cx="3286431" cy="2327839"/>
+          </a:xfrm>
+          <a:prstGeom prst="line">
+            <a:avLst/>
+          </a:prstGeom>
+          <a:ln w="12700">
+            <a:solidFill>
+              <a:schemeClr val="tx1"/>
+            </a:solidFill>
+          </a:ln>
+        </p:spPr>
+        <p:style>
+          <a:lnRef idx="1">
+            <a:schemeClr val="accent1"/>
+          </a:lnRef>
+          <a:fillRef idx="0">
+            <a:schemeClr val="accent1"/>
+          </a:fillRef>
+          <a:effectRef idx="0">
+            <a:schemeClr val="accent1"/>
+          </a:effectRef>
+          <a:fontRef idx="minor">
+            <a:schemeClr val="tx1"/>
+          </a:fontRef>
+        </p:style>
+      </p:cxnSp>
+      <p:pic>
+        <p:nvPicPr>
+          <p:cNvPr id="7" name="Picture 6" descr="Diagram, map&#10;&#10;Description automatically generated">
+            <a:extLst>
+              <a:ext uri="{FF2B5EF4-FFF2-40B4-BE49-F238E27FC236}">
+                <a16:creationId xmlns:a16="http://schemas.microsoft.com/office/drawing/2014/main" id="{8DCE6C51-8421-0C0A-4F7B-1F131985BE2F}"/>
+              </a:ext>
+            </a:extLst>
+          </p:cNvPr>
+          <p:cNvPicPr>
+            <a:picLocks noChangeAspect="1"/>
+          </p:cNvPicPr>
+          <p:nvPr/>
+        </p:nvPicPr>
+        <p:blipFill rotWithShape="1">
+          <a:blip r:embed="rId6">
+            <a:extLst>
+              <a:ext uri="{28A0092B-C50C-407E-A947-70E740481C1C}">
+                <a14:useLocalDpi xmlns:a14="http://schemas.microsoft.com/office/drawing/2010/main" val="0"/>
+              </a:ext>
+            </a:extLst>
+          </a:blip>
+          <a:srcRect l="31622" t="24170" r="39222" b="31308"/>
+          <a:stretch/>
+        </p:blipFill>
+        <p:spPr>
+          <a:xfrm>
+            <a:off x="6096000" y="3594160"/>
+            <a:ext cx="2587557" cy="3053333"/>
+          </a:xfrm>
+          <a:prstGeom prst="rect">
+            <a:avLst/>
+          </a:prstGeom>
+          <a:ln w="12700">
+            <a:solidFill>
+              <a:schemeClr val="tx1"/>
+            </a:solidFill>
+          </a:ln>
+        </p:spPr>
+      </p:pic>
+      <p:pic>
+        <p:nvPicPr>
+          <p:cNvPr id="8" name="Picture 7" descr="Diagram, map&#10;&#10;Description automatically generated">
+            <a:extLst>
+              <a:ext uri="{FF2B5EF4-FFF2-40B4-BE49-F238E27FC236}">
+                <a16:creationId xmlns:a16="http://schemas.microsoft.com/office/drawing/2014/main" id="{0C642524-AE0D-517E-25A3-F825185123E6}"/>
+              </a:ext>
+            </a:extLst>
+          </p:cNvPr>
+          <p:cNvPicPr>
+            <a:picLocks noChangeAspect="1"/>
+          </p:cNvPicPr>
+          <p:nvPr/>
+        </p:nvPicPr>
+        <p:blipFill rotWithShape="1">
+          <a:blip r:embed="rId6">
+            <a:extLst>
+              <a:ext uri="{28A0092B-C50C-407E-A947-70E740481C1C}">
+                <a14:useLocalDpi xmlns:a14="http://schemas.microsoft.com/office/drawing/2010/main" val="0"/>
+              </a:ext>
+            </a:extLst>
+          </a:blip>
+          <a:srcRect l="68049" t="83310" b="5626"/>
+          <a:stretch/>
+        </p:blipFill>
+        <p:spPr>
+          <a:xfrm>
+            <a:off x="9145418" y="5754821"/>
+            <a:ext cx="2835708" cy="758758"/>
+          </a:xfrm>
+          <a:prstGeom prst="rect">
+            <a:avLst/>
+          </a:prstGeom>
+        </p:spPr>
+      </p:pic>
+      <p:pic>
+        <p:nvPicPr>
+          <p:cNvPr id="18" name="Picture 17" descr="Map&#10;&#10;Description automatically generated">
+            <a:extLst>
+              <a:ext uri="{FF2B5EF4-FFF2-40B4-BE49-F238E27FC236}">
+                <a16:creationId xmlns:a16="http://schemas.microsoft.com/office/drawing/2014/main" id="{3FF7FD22-8271-3EA2-67CF-6494F503D2E6}"/>
+              </a:ext>
+            </a:extLst>
+          </p:cNvPr>
+          <p:cNvPicPr>
+            <a:picLocks noChangeAspect="1"/>
+          </p:cNvPicPr>
+          <p:nvPr/>
+        </p:nvPicPr>
+        <p:blipFill rotWithShape="1">
+          <a:blip r:embed="rId7">
+            <a:extLst>
+              <a:ext uri="{28A0092B-C50C-407E-A947-70E740481C1C}">
+                <a14:useLocalDpi xmlns:a14="http://schemas.microsoft.com/office/drawing/2010/main" val="0"/>
+              </a:ext>
+            </a:extLst>
+          </a:blip>
+          <a:srcRect l="29765" t="19166" r="39556" b="39766"/>
+          <a:stretch/>
+        </p:blipFill>
+        <p:spPr>
+          <a:xfrm>
+            <a:off x="7180058" y="515566"/>
+            <a:ext cx="2722699" cy="2816368"/>
+          </a:xfrm>
+          <a:prstGeom prst="rect">
+            <a:avLst/>
+          </a:prstGeom>
+          <a:ln w="12700">
+            <a:solidFill>
+              <a:schemeClr val="tx1"/>
+            </a:solidFill>
+          </a:ln>
+        </p:spPr>
+      </p:pic>
+      <p:pic>
+        <p:nvPicPr>
+          <p:cNvPr id="21" name="Picture 20" descr="Map&#10;&#10;Description automatically generated">
+            <a:extLst>
+              <a:ext uri="{FF2B5EF4-FFF2-40B4-BE49-F238E27FC236}">
+                <a16:creationId xmlns:a16="http://schemas.microsoft.com/office/drawing/2014/main" id="{465239D7-E493-0331-1FA2-FBA2CFCF525B}"/>
+              </a:ext>
+            </a:extLst>
+          </p:cNvPr>
+          <p:cNvPicPr>
+            <a:picLocks noChangeAspect="1"/>
+          </p:cNvPicPr>
+          <p:nvPr/>
+        </p:nvPicPr>
+        <p:blipFill rotWithShape="1">
+          <a:blip r:embed="rId7">
+            <a:extLst>
+              <a:ext uri="{28A0092B-C50C-407E-A947-70E740481C1C}">
+                <a14:useLocalDpi xmlns:a14="http://schemas.microsoft.com/office/drawing/2010/main" val="0"/>
+              </a:ext>
+            </a:extLst>
+          </a:blip>
+          <a:srcRect l="68049" t="83073" b="5154"/>
+          <a:stretch/>
+        </p:blipFill>
+        <p:spPr>
+          <a:xfrm>
+            <a:off x="9145418" y="3429000"/>
+            <a:ext cx="2835708" cy="807396"/>
+          </a:xfrm>
+          <a:prstGeom prst="rect">
+            <a:avLst/>
+          </a:prstGeom>
+        </p:spPr>
+      </p:pic>
+    </p:spTree>
+    <p:extLst>
+      <p:ext uri="{BB962C8B-B14F-4D97-AF65-F5344CB8AC3E}">
+        <p14:creationId xmlns:p14="http://schemas.microsoft.com/office/powerpoint/2010/main" val="3787850109"/>
+      </p:ext>
+    </p:extLst>
+  </p:cSld>
+  <p:clrMapOvr>
+    <a:masterClrMapping/>
+  </p:clrMapOvr>
+</p:sld>
+</file>
+
+<file path=ppt/slides/slide4.xml><?xml version="1.0" encoding="utf-8"?>
+<p:sld xmlns:a="http://schemas.openxmlformats.org/drawingml/2006/main" xmlns:r="http://schemas.openxmlformats.org/officeDocument/2006/relationships" xmlns:p="http://schemas.openxmlformats.org/presentationml/2006/main">
+  <p:cSld>
+    <p:spTree>
+      <p:nvGrpSpPr>
+        <p:cNvPr id="1" name=""/>
+        <p:cNvGrpSpPr/>
+        <p:nvPr/>
+      </p:nvGrpSpPr>
+      <p:grpSpPr>
+        <a:xfrm>
+          <a:off x="0" y="0"/>
+          <a:ext cx="0" cy="0"/>
+          <a:chOff x="0" y="0"/>
+          <a:chExt cx="0" cy="0"/>
+        </a:xfrm>
+      </p:grpSpPr>
       <p:pic>
         <p:nvPicPr>
           <p:cNvPr id="17" name="Picture 16" descr="Diagram, map&#10;&#10;Description automatically generated">
@@ -3375,7 +4956,7 @@
 </p:sld>
 </file>
 
-<file path=ppt/slides/slide2.xml><?xml version="1.0" encoding="utf-8"?>
+<file path=ppt/slides/slide5.xml><?xml version="1.0" encoding="utf-8"?>
 <p:sld xmlns:a="http://schemas.openxmlformats.org/drawingml/2006/main" xmlns:r="http://schemas.openxmlformats.org/officeDocument/2006/relationships" xmlns:p="http://schemas.openxmlformats.org/presentationml/2006/main">
   <p:cSld>
     <p:spTree>
@@ -3421,6 +5002,77 @@
         <p:spPr>
           <a:xfrm>
             <a:off x="1658471" y="0"/>
+            <a:ext cx="8875058" cy="6858000"/>
+          </a:xfrm>
+          <a:prstGeom prst="rect">
+            <a:avLst/>
+          </a:prstGeom>
+        </p:spPr>
+      </p:pic>
+      <p:pic>
+        <p:nvPicPr>
+          <p:cNvPr id="3" name="Picture 2" descr="Map&#10;&#10;Description automatically generated">
+            <a:extLst>
+              <a:ext uri="{FF2B5EF4-FFF2-40B4-BE49-F238E27FC236}">
+                <a16:creationId xmlns:a16="http://schemas.microsoft.com/office/drawing/2014/main" id="{A6BF5FE5-2ADE-7915-A803-4DEFE12A3225}"/>
+              </a:ext>
+            </a:extLst>
+          </p:cNvPr>
+          <p:cNvPicPr>
+            <a:picLocks noChangeAspect="1"/>
+          </p:cNvPicPr>
+          <p:nvPr/>
+        </p:nvPicPr>
+        <p:blipFill rotWithShape="1">
+          <a:blip r:embed="rId2">
+            <a:extLst>
+              <a:ext uri="{28A0092B-C50C-407E-A947-70E740481C1C}">
+                <a14:useLocalDpi xmlns:a14="http://schemas.microsoft.com/office/drawing/2010/main" val="0"/>
+              </a:ext>
+            </a:extLst>
+          </a:blip>
+          <a:srcRect l="67515" t="83259" r="4209" b="4889"/>
+          <a:stretch/>
+        </p:blipFill>
+        <p:spPr>
+          <a:xfrm>
+            <a:off x="9278768" y="1361440"/>
+            <a:ext cx="2509521" cy="812800"/>
+          </a:xfrm>
+          <a:prstGeom prst="rect">
+            <a:avLst/>
+          </a:prstGeom>
+        </p:spPr>
+      </p:pic>
+      <p:pic>
+        <p:nvPicPr>
+          <p:cNvPr id="4" name="Picture 3" descr="Map&#10;&#10;Description automatically generated">
+            <a:extLst>
+              <a:ext uri="{FF2B5EF4-FFF2-40B4-BE49-F238E27FC236}">
+                <a16:creationId xmlns:a16="http://schemas.microsoft.com/office/drawing/2014/main" id="{B4E7F9A3-4D61-9B0C-D56D-734D82A3950C}"/>
+              </a:ext>
+            </a:extLst>
+          </p:cNvPr>
+          <p:cNvPicPr>
+            <a:picLocks noChangeAspect="1"/>
+          </p:cNvPicPr>
+          <p:nvPr/>
+        </p:nvPicPr>
+        <p:blipFill>
+          <a:blip r:embed="rId2">
+            <a:extLst>
+              <a:ext uri="{28A0092B-C50C-407E-A947-70E740481C1C}">
+                <a14:useLocalDpi xmlns:a14="http://schemas.microsoft.com/office/drawing/2010/main" val="0"/>
+              </a:ext>
+            </a:extLst>
+          </a:blip>
+          <a:stretch>
+            <a:fillRect/>
+          </a:stretch>
+        </p:blipFill>
+        <p:spPr>
+          <a:xfrm>
+            <a:off x="1810871" y="152400"/>
             <a:ext cx="8875058" cy="6858000"/>
           </a:xfrm>
           <a:prstGeom prst="rect">
@@ -3441,7 +5093,7 @@
 </p:sld>
 </file>
 
-<file path=ppt/slides/slide3.xml><?xml version="1.0" encoding="utf-8"?>
+<file path=ppt/slides/slide6.xml><?xml version="1.0" encoding="utf-8"?>
 <p:sld xmlns:a="http://schemas.openxmlformats.org/drawingml/2006/main" xmlns:r="http://schemas.openxmlformats.org/officeDocument/2006/relationships" xmlns:p="http://schemas.openxmlformats.org/presentationml/2006/main">
   <p:cSld>
     <p:spTree>
@@ -3507,7 +5159,7 @@
 </p:sld>
 </file>
 
-<file path=ppt/slides/slide4.xml><?xml version="1.0" encoding="utf-8"?>
+<file path=ppt/slides/slide7.xml><?xml version="1.0" encoding="utf-8"?>
 <p:sld xmlns:a="http://schemas.openxmlformats.org/drawingml/2006/main" xmlns:r="http://schemas.openxmlformats.org/officeDocument/2006/relationships" xmlns:p="http://schemas.openxmlformats.org/presentationml/2006/main">
   <p:cSld>
     <p:spTree>
@@ -3573,7 +5225,7 @@
 </p:sld>
 </file>
 
-<file path=ppt/slides/slide5.xml><?xml version="1.0" encoding="utf-8"?>
+<file path=ppt/slides/slide8.xml><?xml version="1.0" encoding="utf-8"?>
 <p:sld xmlns:a="http://schemas.openxmlformats.org/drawingml/2006/main" xmlns:r="http://schemas.openxmlformats.org/officeDocument/2006/relationships" xmlns:p="http://schemas.openxmlformats.org/presentationml/2006/main">
   <p:cSld>
     <p:spTree>
@@ -3639,7 +5291,7 @@
 </p:sld>
 </file>
 
-<file path=ppt/slides/slide6.xml><?xml version="1.0" encoding="utf-8"?>
+<file path=ppt/slides/slide9.xml><?xml version="1.0" encoding="utf-8"?>
 <p:sld xmlns:a="http://schemas.openxmlformats.org/drawingml/2006/main" xmlns:r="http://schemas.openxmlformats.org/officeDocument/2006/relationships" xmlns:p="http://schemas.openxmlformats.org/presentationml/2006/main">
   <p:cSld>
     <p:spTree>

</xml_diff>